<commit_message>
updated presentation and doc name
</commit_message>
<xml_diff>
--- a/TCC_BI_Alunos_Negros.pptx
+++ b/TCC_BI_Alunos_Negros.pptx
@@ -134,7 +134,7 @@
   </p:defaultTextStyle>
   <p:extLst>
     <p:ext uri="{EFAFB233-063F-42B5-8137-9DF3F51BA10A}">
-      <p15:sldGuideLst xmlns="" xmlns:p15="http://schemas.microsoft.com/office/powerpoint/2012/main">
+      <p15:sldGuideLst xmlns:p15="http://schemas.microsoft.com/office/powerpoint/2012/main">
         <p15:guide id="1" orient="horz" pos="2160" userDrawn="1">
           <p15:clr>
             <a:srgbClr val="A4A3A4"/>
@@ -152,7 +152,7 @@
 </file>
 
 <file path=ppt/charts/chart1.xml><?xml version="1.0" encoding="utf-8"?>
-<c:chartSpace xmlns:c="http://schemas.openxmlformats.org/drawingml/2006/chart" xmlns:a="http://schemas.openxmlformats.org/drawingml/2006/main" xmlns:r="http://schemas.openxmlformats.org/officeDocument/2006/relationships">
+<c:chartSpace xmlns:c="http://schemas.openxmlformats.org/drawingml/2006/chart" xmlns:a="http://schemas.openxmlformats.org/drawingml/2006/main" xmlns:r="http://schemas.openxmlformats.org/officeDocument/2006/relationships" xmlns:c16r2="http://schemas.microsoft.com/office/drawing/2015/06/chart">
   <c:date1904 val="0"/>
   <c:lang val="pt-BR"/>
   <c:roundedCorners val="0"/>
@@ -216,6 +216,24 @@
         </a:ln>
         <a:effectLst/>
       </c:spPr>
+      <c:txPr>
+        <a:bodyPr rot="0" spcFirstLastPara="1" vertOverflow="ellipsis" vert="horz" wrap="square" anchor="ctr" anchorCtr="1"/>
+        <a:lstStyle/>
+        <a:p>
+          <a:pPr>
+            <a:defRPr sz="2128" b="1" i="0" u="none" strike="noStrike" kern="1200" spc="100" baseline="0">
+              <a:solidFill>
+                <a:schemeClr val="tx1"/>
+              </a:solidFill>
+              <a:effectLst/>
+              <a:latin typeface="+mn-lt"/>
+              <a:ea typeface="+mn-ea"/>
+              <a:cs typeface="+mn-cs"/>
+            </a:defRPr>
+          </a:pPr>
+          <a:endParaRPr lang="pt-BR"/>
+        </a:p>
+      </c:txPr>
     </c:title>
     <c:autoTitleDeleted val="0"/>
     <c:plotArea>
@@ -317,7 +335,7 @@
             <c:showPercent val="0"/>
             <c:showBubbleSize val="0"/>
             <c:showLeaderLines val="0"/>
-            <c:extLst xmlns:c16r2="http://schemas.microsoft.com/office/drawing/2015/06/chart">
+            <c:extLst>
               <c:ext xmlns:c15="http://schemas.microsoft.com/office/drawing/2012/chart" uri="{CE6537A1-D6FC-4f65-9D91-7224C49458BB}">
                 <c15:showLeaderLines val="1"/>
                 <c15:leaderLines>
@@ -378,7 +396,7 @@
               </c:numCache>
             </c:numRef>
           </c:val>
-          <c:extLst xmlns:c16r2="http://schemas.microsoft.com/office/drawing/2015/06/chart">
+          <c:extLst>
             <c:ext xmlns:c16="http://schemas.microsoft.com/office/drawing/2014/chart" uri="{C3380CC4-5D6E-409C-BE32-E72D297353CC}">
               <c16:uniqueId val="{00000000-255E-411E-93BF-9D6E46F713C1}"/>
             </c:ext>
@@ -477,7 +495,7 @@
             <c:showPercent val="0"/>
             <c:showBubbleSize val="0"/>
             <c:showLeaderLines val="0"/>
-            <c:extLst xmlns:c16r2="http://schemas.microsoft.com/office/drawing/2015/06/chart">
+            <c:extLst>
               <c:ext xmlns:c15="http://schemas.microsoft.com/office/drawing/2012/chart" uri="{CE6537A1-D6FC-4f65-9D91-7224C49458BB}">
                 <c15:showLeaderLines val="1"/>
                 <c15:leaderLines>
@@ -538,7 +556,7 @@
               </c:numCache>
             </c:numRef>
           </c:val>
-          <c:extLst xmlns:c16r2="http://schemas.microsoft.com/office/drawing/2015/06/chart">
+          <c:extLst>
             <c:ext xmlns:c16="http://schemas.microsoft.com/office/drawing/2014/chart" uri="{C3380CC4-5D6E-409C-BE32-E72D297353CC}">
               <c16:uniqueId val="{00000001-255E-411E-93BF-9D6E46F713C1}"/>
             </c:ext>
@@ -637,7 +655,7 @@
             <c:showPercent val="0"/>
             <c:showBubbleSize val="0"/>
             <c:showLeaderLines val="0"/>
-            <c:extLst xmlns:c16r2="http://schemas.microsoft.com/office/drawing/2015/06/chart">
+            <c:extLst>
               <c:ext xmlns:c15="http://schemas.microsoft.com/office/drawing/2012/chart" uri="{CE6537A1-D6FC-4f65-9D91-7224C49458BB}">
                 <c15:showLeaderLines val="1"/>
                 <c15:leaderLines>
@@ -698,7 +716,7 @@
               </c:numCache>
             </c:numRef>
           </c:val>
-          <c:extLst xmlns:c16r2="http://schemas.microsoft.com/office/drawing/2015/06/chart">
+          <c:extLst>
             <c:ext xmlns:c16="http://schemas.microsoft.com/office/drawing/2014/chart" uri="{C3380CC4-5D6E-409C-BE32-E72D297353CC}">
               <c16:uniqueId val="{00000002-255E-411E-93BF-9D6E46F713C1}"/>
             </c:ext>
@@ -780,7 +798,7 @@
               <c:showSerName val="0"/>
               <c:showPercent val="0"/>
               <c:showBubbleSize val="0"/>
-              <c:extLst xmlns:c16r2="http://schemas.microsoft.com/office/drawing/2015/06/chart">
+              <c:extLst>
                 <c:ext xmlns:c15="http://schemas.microsoft.com/office/drawing/2012/chart" uri="{CE6537A1-D6FC-4f65-9D91-7224C49458BB}"/>
                 <c:ext xmlns:c16="http://schemas.microsoft.com/office/drawing/2014/chart" uri="{C3380CC4-5D6E-409C-BE32-E72D297353CC}">
                   <c16:uniqueId val="{00000003-255E-411E-93BF-9D6E46F713C1}"/>
@@ -818,7 +836,7 @@
             <c:showPercent val="0"/>
             <c:showBubbleSize val="0"/>
             <c:showLeaderLines val="0"/>
-            <c:extLst xmlns:c16r2="http://schemas.microsoft.com/office/drawing/2015/06/chart">
+            <c:extLst>
               <c:ext xmlns:c15="http://schemas.microsoft.com/office/drawing/2012/chart" uri="{CE6537A1-D6FC-4f65-9D91-7224C49458BB}">
                 <c15:showLeaderLines val="1"/>
                 <c15:leaderLines>
@@ -879,7 +897,7 @@
               </c:numCache>
             </c:numRef>
           </c:val>
-          <c:extLst xmlns:c16r2="http://schemas.microsoft.com/office/drawing/2015/06/chart">
+          <c:extLst>
             <c:ext xmlns:c16="http://schemas.microsoft.com/office/drawing/2014/chart" uri="{C3380CC4-5D6E-409C-BE32-E72D297353CC}">
               <c16:uniqueId val="{00000004-255E-411E-93BF-9D6E46F713C1}"/>
             </c:ext>
@@ -978,7 +996,7 @@
             <c:showPercent val="0"/>
             <c:showBubbleSize val="0"/>
             <c:showLeaderLines val="0"/>
-            <c:extLst xmlns:c16r2="http://schemas.microsoft.com/office/drawing/2015/06/chart">
+            <c:extLst>
               <c:ext xmlns:c15="http://schemas.microsoft.com/office/drawing/2012/chart" uri="{CE6537A1-D6FC-4f65-9D91-7224C49458BB}">
                 <c15:showLeaderLines val="1"/>
                 <c15:leaderLines>
@@ -1039,7 +1057,7 @@
               </c:numCache>
             </c:numRef>
           </c:val>
-          <c:extLst xmlns:c16r2="http://schemas.microsoft.com/office/drawing/2015/06/chart">
+          <c:extLst>
             <c:ext xmlns:c16="http://schemas.microsoft.com/office/drawing/2014/chart" uri="{C3380CC4-5D6E-409C-BE32-E72D297353CC}">
               <c16:uniqueId val="{00000005-255E-411E-93BF-9D6E46F713C1}"/>
             </c:ext>
@@ -1138,7 +1156,7 @@
             <c:showPercent val="0"/>
             <c:showBubbleSize val="0"/>
             <c:showLeaderLines val="0"/>
-            <c:extLst xmlns:c16r2="http://schemas.microsoft.com/office/drawing/2015/06/chart">
+            <c:extLst>
               <c:ext xmlns:c15="http://schemas.microsoft.com/office/drawing/2012/chart" uri="{CE6537A1-D6FC-4f65-9D91-7224C49458BB}">
                 <c15:showLeaderLines val="1"/>
                 <c15:leaderLines>
@@ -1199,7 +1217,7 @@
               </c:numCache>
             </c:numRef>
           </c:val>
-          <c:extLst xmlns:c16r2="http://schemas.microsoft.com/office/drawing/2015/06/chart">
+          <c:extLst>
             <c:ext xmlns:c16="http://schemas.microsoft.com/office/drawing/2014/chart" uri="{C3380CC4-5D6E-409C-BE32-E72D297353CC}">
               <c16:uniqueId val="{00000006-255E-411E-93BF-9D6E46F713C1}"/>
             </c:ext>
@@ -1290,7 +1308,6 @@
     </c:plotArea>
     <c:legend>
       <c:legendPos val="b"/>
-      <c:layout/>
       <c:overlay val="0"/>
       <c:spPr>
         <a:noFill/>
@@ -1344,14 +1361,14 @@
       <a:endParaRPr lang="pt-BR"/>
     </a:p>
   </c:txPr>
-  <c:externalData r:id="rId1">
+  <c:externalData r:id="rId3">
     <c:autoUpdate val="0"/>
   </c:externalData>
 </c:chartSpace>
 </file>
 
 <file path=ppt/charts/chart2.xml><?xml version="1.0" encoding="utf-8"?>
-<c:chartSpace xmlns:c="http://schemas.openxmlformats.org/drawingml/2006/chart" xmlns:a="http://schemas.openxmlformats.org/drawingml/2006/main" xmlns:r="http://schemas.openxmlformats.org/officeDocument/2006/relationships">
+<c:chartSpace xmlns:c="http://schemas.openxmlformats.org/drawingml/2006/chart" xmlns:a="http://schemas.openxmlformats.org/drawingml/2006/main" xmlns:r="http://schemas.openxmlformats.org/officeDocument/2006/relationships" xmlns:c16r2="http://schemas.microsoft.com/office/drawing/2015/06/chart">
   <c:date1904 val="0"/>
   <c:lang val="pt-BR"/>
   <c:roundedCorners val="0"/>
@@ -1405,6 +1422,30 @@
         </a:ln>
         <a:effectLst/>
       </c:spPr>
+      <c:txPr>
+        <a:bodyPr rot="0" spcFirstLastPara="1" vertOverflow="ellipsis" vert="horz" wrap="square" anchor="ctr" anchorCtr="1"/>
+        <a:lstStyle/>
+        <a:p>
+          <a:pPr>
+            <a:defRPr sz="2128" b="1" i="0" u="none" strike="noStrike" kern="1200" spc="100" baseline="0">
+              <a:solidFill>
+                <a:schemeClr val="tx1"/>
+              </a:solidFill>
+              <a:effectLst>
+                <a:outerShdw blurRad="50800" dist="38100" dir="5400000" algn="t" rotWithShape="0">
+                  <a:prstClr val="black">
+                    <a:alpha val="40000"/>
+                  </a:prstClr>
+                </a:outerShdw>
+              </a:effectLst>
+              <a:latin typeface="+mn-lt"/>
+              <a:ea typeface="+mn-ea"/>
+              <a:cs typeface="+mn-cs"/>
+            </a:defRPr>
+          </a:pPr>
+          <a:endParaRPr lang="pt-BR"/>
+        </a:p>
+      </c:txPr>
     </c:title>
     <c:autoTitleDeleted val="0"/>
     <c:plotArea>
@@ -1529,8 +1570,9 @@
             <c:showPercent val="0"/>
             <c:showBubbleSize val="0"/>
             <c:showLeaderLines val="0"/>
-            <c:extLst xmlns:c16r2="http://schemas.microsoft.com/office/drawing/2015/06/chart">
+            <c:extLst>
               <c:ext xmlns:c15="http://schemas.microsoft.com/office/drawing/2012/chart" uri="{CE6537A1-D6FC-4f65-9D91-7224C49458BB}">
+                <c15:layout/>
                 <c15:showLeaderLines val="1"/>
                 <c15:leaderLines>
                   <c:spPr>
@@ -1591,7 +1633,7 @@
             </c:numRef>
           </c:val>
           <c:smooth val="0"/>
-          <c:extLst xmlns:c16r2="http://schemas.microsoft.com/office/drawing/2015/06/chart">
+          <c:extLst>
             <c:ext xmlns:c16="http://schemas.microsoft.com/office/drawing/2014/chart" uri="{C3380CC4-5D6E-409C-BE32-E72D297353CC}">
               <c16:uniqueId val="{00000000-FEA7-4093-975A-07747621BF88}"/>
             </c:ext>
@@ -1709,14 +1751,14 @@
       <a:endParaRPr lang="pt-BR"/>
     </a:p>
   </c:txPr>
-  <c:externalData r:id="rId1">
+  <c:externalData r:id="rId3">
     <c:autoUpdate val="0"/>
   </c:externalData>
 </c:chartSpace>
 </file>
 
 <file path=ppt/charts/chart3.xml><?xml version="1.0" encoding="utf-8"?>
-<c:chartSpace xmlns:c="http://schemas.openxmlformats.org/drawingml/2006/chart" xmlns:a="http://schemas.openxmlformats.org/drawingml/2006/main" xmlns:r="http://schemas.openxmlformats.org/officeDocument/2006/relationships">
+<c:chartSpace xmlns:c="http://schemas.openxmlformats.org/drawingml/2006/chart" xmlns:a="http://schemas.openxmlformats.org/drawingml/2006/main" xmlns:r="http://schemas.openxmlformats.org/officeDocument/2006/relationships" xmlns:c16r2="http://schemas.microsoft.com/office/drawing/2015/06/chart">
   <c:date1904 val="0"/>
   <c:lang val="pt-BR"/>
   <c:roundedCorners val="0"/>
@@ -1773,6 +1815,30 @@
         </a:ln>
         <a:effectLst/>
       </c:spPr>
+      <c:txPr>
+        <a:bodyPr rot="0" spcFirstLastPara="1" vertOverflow="ellipsis" vert="horz" wrap="square" anchor="ctr" anchorCtr="1"/>
+        <a:lstStyle/>
+        <a:p>
+          <a:pPr>
+            <a:defRPr sz="2128" b="1" i="0" u="none" strike="noStrike" kern="1200" spc="100" baseline="0">
+              <a:solidFill>
+                <a:schemeClr val="tx1"/>
+              </a:solidFill>
+              <a:effectLst>
+                <a:outerShdw blurRad="50800" dist="38100" dir="5400000" algn="t" rotWithShape="0">
+                  <a:prstClr val="black">
+                    <a:alpha val="40000"/>
+                  </a:prstClr>
+                </a:outerShdw>
+              </a:effectLst>
+              <a:latin typeface="+mn-lt"/>
+              <a:ea typeface="+mn-ea"/>
+              <a:cs typeface="+mn-cs"/>
+            </a:defRPr>
+          </a:pPr>
+          <a:endParaRPr lang="pt-BR"/>
+        </a:p>
+      </c:txPr>
     </c:title>
     <c:autoTitleDeleted val="0"/>
     <c:plotArea>
@@ -1874,8 +1940,9 @@
             <c:showPercent val="0"/>
             <c:showBubbleSize val="0"/>
             <c:showLeaderLines val="0"/>
-            <c:extLst xmlns:c16r2="http://schemas.microsoft.com/office/drawing/2015/06/chart">
+            <c:extLst>
               <c:ext xmlns:c15="http://schemas.microsoft.com/office/drawing/2012/chart" uri="{CE6537A1-D6FC-4f65-9D91-7224C49458BB}">
+                <c15:layout/>
                 <c15:showLeaderLines val="1"/>
                 <c15:leaderLines>
                   <c:spPr>
@@ -1970,7 +2037,7 @@
               </c:numCache>
             </c:numRef>
           </c:val>
-          <c:extLst xmlns:c16r2="http://schemas.microsoft.com/office/drawing/2015/06/chart">
+          <c:extLst>
             <c:ext xmlns:c16="http://schemas.microsoft.com/office/drawing/2014/chart" uri="{C3380CC4-5D6E-409C-BE32-E72D297353CC}">
               <c16:uniqueId val="{00000000-43E0-4529-8164-E5D1E3A81B68}"/>
             </c:ext>
@@ -2086,14 +2153,14 @@
       <a:endParaRPr lang="pt-BR"/>
     </a:p>
   </c:txPr>
-  <c:externalData r:id="rId1">
+  <c:externalData r:id="rId3">
     <c:autoUpdate val="0"/>
   </c:externalData>
 </c:chartSpace>
 </file>
 
 <file path=ppt/charts/chart4.xml><?xml version="1.0" encoding="utf-8"?>
-<c:chartSpace xmlns:c="http://schemas.openxmlformats.org/drawingml/2006/chart" xmlns:a="http://schemas.openxmlformats.org/drawingml/2006/main" xmlns:r="http://schemas.openxmlformats.org/officeDocument/2006/relationships">
+<c:chartSpace xmlns:c="http://schemas.openxmlformats.org/drawingml/2006/chart" xmlns:a="http://schemas.openxmlformats.org/drawingml/2006/main" xmlns:r="http://schemas.openxmlformats.org/officeDocument/2006/relationships" xmlns:c16r2="http://schemas.microsoft.com/office/drawing/2015/06/chart">
   <c:date1904 val="0"/>
   <c:lang val="pt-BR"/>
   <c:roundedCorners val="0"/>
@@ -2146,6 +2213,30 @@
         </a:ln>
         <a:effectLst/>
       </c:spPr>
+      <c:txPr>
+        <a:bodyPr rot="0" spcFirstLastPara="1" vertOverflow="ellipsis" vert="horz" wrap="square" anchor="ctr" anchorCtr="1"/>
+        <a:lstStyle/>
+        <a:p>
+          <a:pPr>
+            <a:defRPr sz="2128" b="1" i="0" u="none" strike="noStrike" kern="1200" spc="100" baseline="0">
+              <a:solidFill>
+                <a:schemeClr val="tx1"/>
+              </a:solidFill>
+              <a:effectLst>
+                <a:outerShdw blurRad="50800" dist="38100" dir="5400000" algn="t" rotWithShape="0">
+                  <a:prstClr val="black">
+                    <a:alpha val="40000"/>
+                  </a:prstClr>
+                </a:outerShdw>
+              </a:effectLst>
+              <a:latin typeface="+mn-lt"/>
+              <a:ea typeface="+mn-ea"/>
+              <a:cs typeface="+mn-cs"/>
+            </a:defRPr>
+          </a:pPr>
+          <a:endParaRPr lang="pt-BR"/>
+        </a:p>
+      </c:txPr>
     </c:title>
     <c:autoTitleDeleted val="0"/>
     <c:plotArea>
@@ -2247,8 +2338,9 @@
             <c:showPercent val="0"/>
             <c:showBubbleSize val="0"/>
             <c:showLeaderLines val="0"/>
-            <c:extLst xmlns:c16r2="http://schemas.microsoft.com/office/drawing/2015/06/chart">
+            <c:extLst>
               <c:ext xmlns:c15="http://schemas.microsoft.com/office/drawing/2012/chart" uri="{CE6537A1-D6FC-4f65-9D91-7224C49458BB}">
+                <c15:layout/>
                 <c15:showLeaderLines val="1"/>
                 <c15:leaderLines>
                   <c:spPr>
@@ -2343,7 +2435,7 @@
               </c:numCache>
             </c:numRef>
           </c:val>
-          <c:extLst xmlns:c16r2="http://schemas.microsoft.com/office/drawing/2015/06/chart">
+          <c:extLst>
             <c:ext xmlns:c16="http://schemas.microsoft.com/office/drawing/2014/chart" uri="{C3380CC4-5D6E-409C-BE32-E72D297353CC}">
               <c16:uniqueId val="{00000000-B540-4E6C-8837-15EAD3EDF728}"/>
             </c:ext>
@@ -2459,14 +2551,14 @@
       <a:endParaRPr lang="pt-BR"/>
     </a:p>
   </c:txPr>
-  <c:externalData r:id="rId1">
+  <c:externalData r:id="rId3">
     <c:autoUpdate val="0"/>
   </c:externalData>
 </c:chartSpace>
 </file>
 
 <file path=ppt/charts/chart5.xml><?xml version="1.0" encoding="utf-8"?>
-<c:chartSpace xmlns:c="http://schemas.openxmlformats.org/drawingml/2006/chart" xmlns:a="http://schemas.openxmlformats.org/drawingml/2006/main" xmlns:r="http://schemas.openxmlformats.org/officeDocument/2006/relationships">
+<c:chartSpace xmlns:c="http://schemas.openxmlformats.org/drawingml/2006/chart" xmlns:a="http://schemas.openxmlformats.org/drawingml/2006/main" xmlns:r="http://schemas.openxmlformats.org/officeDocument/2006/relationships" xmlns:c16r2="http://schemas.microsoft.com/office/drawing/2015/06/chart">
   <c:date1904 val="0"/>
   <c:lang val="pt-BR"/>
   <c:roundedCorners val="0"/>
@@ -2523,6 +2615,30 @@
         </a:ln>
         <a:effectLst/>
       </c:spPr>
+      <c:txPr>
+        <a:bodyPr rot="0" spcFirstLastPara="1" vertOverflow="ellipsis" vert="horz" wrap="square" anchor="ctr" anchorCtr="1"/>
+        <a:lstStyle/>
+        <a:p>
+          <a:pPr>
+            <a:defRPr sz="2128" b="1" i="0" u="none" strike="noStrike" kern="1200" spc="100" baseline="0">
+              <a:solidFill>
+                <a:schemeClr val="tx1"/>
+              </a:solidFill>
+              <a:effectLst>
+                <a:outerShdw blurRad="50800" dist="38100" dir="5400000" algn="t" rotWithShape="0">
+                  <a:prstClr val="black">
+                    <a:alpha val="40000"/>
+                  </a:prstClr>
+                </a:outerShdw>
+              </a:effectLst>
+              <a:latin typeface="+mn-lt"/>
+              <a:ea typeface="+mn-ea"/>
+              <a:cs typeface="+mn-cs"/>
+            </a:defRPr>
+          </a:pPr>
+          <a:endParaRPr lang="pt-BR"/>
+        </a:p>
+      </c:txPr>
     </c:title>
     <c:autoTitleDeleted val="0"/>
     <c:plotArea>
@@ -2647,8 +2763,9 @@
             <c:showPercent val="0"/>
             <c:showBubbleSize val="0"/>
             <c:showLeaderLines val="0"/>
-            <c:extLst xmlns:c16r2="http://schemas.microsoft.com/office/drawing/2015/06/chart">
+            <c:extLst>
               <c:ext xmlns:c15="http://schemas.microsoft.com/office/drawing/2012/chart" uri="{CE6537A1-D6FC-4f65-9D91-7224C49458BB}">
+                <c15:layout/>
                 <c15:showLeaderLines val="1"/>
                 <c15:leaderLines>
                   <c:spPr>
@@ -2709,7 +2826,7 @@
             </c:numRef>
           </c:val>
           <c:smooth val="0"/>
-          <c:extLst xmlns:c16r2="http://schemas.microsoft.com/office/drawing/2015/06/chart">
+          <c:extLst>
             <c:ext xmlns:c16="http://schemas.microsoft.com/office/drawing/2014/chart" uri="{C3380CC4-5D6E-409C-BE32-E72D297353CC}">
               <c16:uniqueId val="{00000000-1587-4608-95AF-4B132C95887F}"/>
             </c:ext>
@@ -2827,14 +2944,14 @@
       <a:endParaRPr lang="pt-BR"/>
     </a:p>
   </c:txPr>
-  <c:externalData r:id="rId1">
+  <c:externalData r:id="rId3">
     <c:autoUpdate val="0"/>
   </c:externalData>
 </c:chartSpace>
 </file>
 
 <file path=ppt/charts/chart6.xml><?xml version="1.0" encoding="utf-8"?>
-<c:chartSpace xmlns:c="http://schemas.openxmlformats.org/drawingml/2006/chart" xmlns:a="http://schemas.openxmlformats.org/drawingml/2006/main" xmlns:r="http://schemas.openxmlformats.org/officeDocument/2006/relationships">
+<c:chartSpace xmlns:c="http://schemas.openxmlformats.org/drawingml/2006/chart" xmlns:a="http://schemas.openxmlformats.org/drawingml/2006/main" xmlns:r="http://schemas.openxmlformats.org/officeDocument/2006/relationships" xmlns:c16r2="http://schemas.microsoft.com/office/drawing/2015/06/chart">
   <c:date1904 val="0"/>
   <c:lang val="pt-BR"/>
   <c:roundedCorners val="0"/>
@@ -2891,6 +3008,30 @@
         </a:ln>
         <a:effectLst/>
       </c:spPr>
+      <c:txPr>
+        <a:bodyPr rot="0" spcFirstLastPara="1" vertOverflow="ellipsis" vert="horz" wrap="square" anchor="ctr" anchorCtr="1"/>
+        <a:lstStyle/>
+        <a:p>
+          <a:pPr>
+            <a:defRPr sz="2128" b="1" i="0" u="none" strike="noStrike" kern="1200" spc="100" baseline="0">
+              <a:solidFill>
+                <a:schemeClr val="tx1"/>
+              </a:solidFill>
+              <a:effectLst>
+                <a:outerShdw blurRad="50800" dist="38100" dir="5400000" algn="t" rotWithShape="0">
+                  <a:prstClr val="black">
+                    <a:alpha val="40000"/>
+                  </a:prstClr>
+                </a:outerShdw>
+              </a:effectLst>
+              <a:latin typeface="+mn-lt"/>
+              <a:ea typeface="+mn-ea"/>
+              <a:cs typeface="+mn-cs"/>
+            </a:defRPr>
+          </a:pPr>
+          <a:endParaRPr lang="pt-BR"/>
+        </a:p>
+      </c:txPr>
     </c:title>
     <c:autoTitleDeleted val="0"/>
     <c:plotArea>
@@ -2992,8 +3133,9 @@
             <c:showPercent val="0"/>
             <c:showBubbleSize val="0"/>
             <c:showLeaderLines val="0"/>
-            <c:extLst xmlns:c16r2="http://schemas.microsoft.com/office/drawing/2015/06/chart">
+            <c:extLst>
               <c:ext xmlns:c15="http://schemas.microsoft.com/office/drawing/2012/chart" uri="{CE6537A1-D6FC-4f65-9D91-7224C49458BB}">
+                <c15:layout/>
                 <c15:showLeaderLines val="1"/>
                 <c15:leaderLines>
                   <c:spPr>
@@ -3053,7 +3195,7 @@
               </c:numCache>
             </c:numRef>
           </c:val>
-          <c:extLst xmlns:c16r2="http://schemas.microsoft.com/office/drawing/2015/06/chart">
+          <c:extLst>
             <c:ext xmlns:c16="http://schemas.microsoft.com/office/drawing/2014/chart" uri="{C3380CC4-5D6E-409C-BE32-E72D297353CC}">
               <c16:uniqueId val="{00000000-D8CD-42D2-863B-B905448DAC26}"/>
             </c:ext>
@@ -3152,8 +3294,9 @@
             <c:showPercent val="0"/>
             <c:showBubbleSize val="0"/>
             <c:showLeaderLines val="0"/>
-            <c:extLst xmlns:c16r2="http://schemas.microsoft.com/office/drawing/2015/06/chart">
+            <c:extLst>
               <c:ext xmlns:c15="http://schemas.microsoft.com/office/drawing/2012/chart" uri="{CE6537A1-D6FC-4f65-9D91-7224C49458BB}">
+                <c15:layout/>
                 <c15:showLeaderLines val="1"/>
                 <c15:leaderLines>
                   <c:spPr>
@@ -3213,7 +3356,7 @@
               </c:numCache>
             </c:numRef>
           </c:val>
-          <c:extLst xmlns:c16r2="http://schemas.microsoft.com/office/drawing/2015/06/chart">
+          <c:extLst>
             <c:ext xmlns:c16="http://schemas.microsoft.com/office/drawing/2014/chart" uri="{C3380CC4-5D6E-409C-BE32-E72D297353CC}">
               <c16:uniqueId val="{00000001-D8CD-42D2-863B-B905448DAC26}"/>
             </c:ext>
@@ -3358,7 +3501,7 @@
       <a:endParaRPr lang="pt-BR"/>
     </a:p>
   </c:txPr>
-  <c:externalData r:id="rId1">
+  <c:externalData r:id="rId3">
     <c:autoUpdate val="0"/>
   </c:externalData>
 </c:chartSpace>
@@ -6662,7 +6805,7 @@
           <a:p>
             <a:fld id="{892BBDE4-B257-4B28-AF9B-80911A110866}" type="datetimeFigureOut">
               <a:rPr lang="pt-BR" smtClean="0"/>
-              <a:t>12/12/2019</a:t>
+              <a:t>13/12/2019</a:t>
             </a:fld>
             <a:endParaRPr lang="pt-BR"/>
           </a:p>
@@ -9617,7 +9760,7 @@
           <a:p>
             <a:fld id="{5608231A-01C7-43A8-9F27-B8568746F2D0}" type="datetime1">
               <a:rPr lang="pt-BR" smtClean="0"/>
-              <a:t>12/12/2019</a:t>
+              <a:t>13/12/2019</a:t>
             </a:fld>
             <a:endParaRPr lang="pt-BR"/>
           </a:p>
@@ -9787,7 +9930,7 @@
           <a:p>
             <a:fld id="{CA90437F-4746-41D5-875E-3EDF8407A153}" type="datetime1">
               <a:rPr lang="pt-BR" smtClean="0"/>
-              <a:t>12/12/2019</a:t>
+              <a:t>13/12/2019</a:t>
             </a:fld>
             <a:endParaRPr lang="pt-BR"/>
           </a:p>
@@ -9967,7 +10110,7 @@
           <a:p>
             <a:fld id="{C9BABADB-CEE7-4513-85C6-02AC753FE149}" type="datetime1">
               <a:rPr lang="pt-BR" smtClean="0"/>
-              <a:t>12/12/2019</a:t>
+              <a:t>13/12/2019</a:t>
             </a:fld>
             <a:endParaRPr lang="pt-BR"/>
           </a:p>
@@ -10137,7 +10280,7 @@
           <a:p>
             <a:fld id="{4E8CA431-1949-4491-8E05-D347E3C74D10}" type="datetime1">
               <a:rPr lang="pt-BR" smtClean="0"/>
-              <a:t>12/12/2019</a:t>
+              <a:t>13/12/2019</a:t>
             </a:fld>
             <a:endParaRPr lang="pt-BR"/>
           </a:p>
@@ -10383,7 +10526,7 @@
           <a:p>
             <a:fld id="{2E967C8F-DAFF-4C6C-A210-F26CDA289138}" type="datetime1">
               <a:rPr lang="pt-BR" smtClean="0"/>
-              <a:t>12/12/2019</a:t>
+              <a:t>13/12/2019</a:t>
             </a:fld>
             <a:endParaRPr lang="pt-BR"/>
           </a:p>
@@ -10671,7 +10814,7 @@
           <a:p>
             <a:fld id="{72FA03A6-FA3E-4FD5-BDA2-C2E2A7B9D603}" type="datetime1">
               <a:rPr lang="pt-BR" smtClean="0"/>
-              <a:t>12/12/2019</a:t>
+              <a:t>13/12/2019</a:t>
             </a:fld>
             <a:endParaRPr lang="pt-BR"/>
           </a:p>
@@ -11093,7 +11236,7 @@
           <a:p>
             <a:fld id="{9952EAC6-DEB8-400E-A784-4E74099B4BB6}" type="datetime1">
               <a:rPr lang="pt-BR" smtClean="0"/>
-              <a:t>12/12/2019</a:t>
+              <a:t>13/12/2019</a:t>
             </a:fld>
             <a:endParaRPr lang="pt-BR"/>
           </a:p>
@@ -11211,7 +11354,7 @@
           <a:p>
             <a:fld id="{FC7B5247-18B5-42C5-B49D-DD105872AB72}" type="datetime1">
               <a:rPr lang="pt-BR" smtClean="0"/>
-              <a:t>12/12/2019</a:t>
+              <a:t>13/12/2019</a:t>
             </a:fld>
             <a:endParaRPr lang="pt-BR"/>
           </a:p>
@@ -11306,7 +11449,7 @@
           <a:p>
             <a:fld id="{F67A856F-47A2-47FE-8E15-AFCA9D099C04}" type="datetime1">
               <a:rPr lang="pt-BR" smtClean="0"/>
-              <a:t>12/12/2019</a:t>
+              <a:t>13/12/2019</a:t>
             </a:fld>
             <a:endParaRPr lang="pt-BR"/>
           </a:p>
@@ -11583,7 +11726,7 @@
           <a:p>
             <a:fld id="{A6FAD85C-2C24-4C92-B3DE-64369A769FDA}" type="datetime1">
               <a:rPr lang="pt-BR" smtClean="0"/>
-              <a:t>12/12/2019</a:t>
+              <a:t>13/12/2019</a:t>
             </a:fld>
             <a:endParaRPr lang="pt-BR"/>
           </a:p>
@@ -11836,7 +11979,7 @@
           <a:p>
             <a:fld id="{0CD11CC5-01CD-4AA9-8FD2-35C2BF59A90E}" type="datetime1">
               <a:rPr lang="pt-BR" smtClean="0"/>
-              <a:t>12/12/2019</a:t>
+              <a:t>13/12/2019</a:t>
             </a:fld>
             <a:endParaRPr lang="pt-BR"/>
           </a:p>
@@ -12079,7 +12222,7 @@
           <a:p>
             <a:fld id="{C58C9F72-14F3-4865-972A-67D71CFBAA47}" type="datetime1">
               <a:rPr lang="pt-BR" smtClean="0"/>
-              <a:t>12/12/2019</a:t>
+              <a:t>13/12/2019</a:t>
             </a:fld>
             <a:endParaRPr lang="pt-BR"/>
           </a:p>
@@ -12484,7 +12627,43 @@
                 </a:solidFill>
                 <a:latin typeface="+mn-lt"/>
               </a:rPr>
-              <a:t>Análise do panorama da atuação do aluno negro na educação básica brasileira de 2015 a 2018 utilizando </a:t>
+              <a:t>Análise do panorama da </a:t>
+            </a:r>
+            <a:r>
+              <a:rPr lang="pt-BR" sz="2800" b="1" dirty="0" smtClean="0">
+                <a:solidFill>
+                  <a:srgbClr val="C00000"/>
+                </a:solidFill>
+                <a:latin typeface="+mn-lt"/>
+              </a:rPr>
+              <a:t>inserção</a:t>
+            </a:r>
+            <a:r>
+              <a:rPr lang="pt-BR" sz="2800" b="1" dirty="0" smtClean="0">
+                <a:solidFill>
+                  <a:srgbClr val="C00000"/>
+                </a:solidFill>
+                <a:latin typeface="+mn-lt"/>
+              </a:rPr>
+              <a:t> </a:t>
+            </a:r>
+            <a:r>
+              <a:rPr lang="pt-BR" sz="2800" b="1" dirty="0">
+                <a:solidFill>
+                  <a:srgbClr val="C00000"/>
+                </a:solidFill>
+                <a:latin typeface="+mn-lt"/>
+              </a:rPr>
+              <a:t>do aluno negro na educação básica brasileira de 2015 a 2018 </a:t>
+            </a:r>
+            <a:r>
+              <a:rPr lang="pt-BR" sz="2800" b="1" dirty="0" smtClean="0">
+                <a:solidFill>
+                  <a:srgbClr val="C00000"/>
+                </a:solidFill>
+                <a:latin typeface="+mn-lt"/>
+              </a:rPr>
+              <a:t>utilizando a abordagem de </a:t>
             </a:r>
             <a:r>
               <a:rPr lang="pt-BR" sz="2800" b="1" i="1" dirty="0">
@@ -12516,7 +12695,7 @@
         </p:spPr>
         <p:txBody>
           <a:bodyPr>
-            <a:normAutofit lnSpcReduction="10000"/>
+            <a:normAutofit/>
           </a:bodyPr>
           <a:lstStyle/>
           <a:p>
@@ -12560,20 +12739,21 @@
                   <a:schemeClr val="tx1"/>
                 </a:solidFill>
               </a:rPr>
-              <a:t>Pedro Henrique Pereira De Oliveira</a:t>
-            </a:r>
-          </a:p>
-          <a:p>
-            <a:pPr algn="r"/>
-            <a:r>
-              <a:rPr lang="pt-BR" sz="2000" b="1" dirty="0">
+              <a:t>Pedro Henrique Pereira De </a:t>
+            </a:r>
+            <a:r>
+              <a:rPr lang="pt-BR" sz="2000" b="1" dirty="0" smtClean="0">
                 <a:solidFill>
                   <a:schemeClr val="tx1"/>
                 </a:solidFill>
               </a:rPr>
-              <a:t>Willian De Sousa Rodrigues</a:t>
-            </a:r>
-            <a:endParaRPr lang="pt-BR" sz="2400" dirty="0"/>
+              <a:t>Oliveira</a:t>
+            </a:r>
+            <a:endParaRPr lang="pt-BR" sz="2000" b="1" dirty="0">
+              <a:solidFill>
+                <a:schemeClr val="tx1"/>
+              </a:solidFill>
+            </a:endParaRPr>
           </a:p>
         </p:txBody>
       </p:sp>
@@ -17059,7 +17239,7 @@
         <p:spPr>
           <a:xfrm>
             <a:off x="1480828" y="4101747"/>
-            <a:ext cx="6264696" cy="1631216"/>
+            <a:ext cx="6264696" cy="1323439"/>
           </a:xfrm>
           <a:prstGeom prst="rect">
             <a:avLst/>
@@ -17095,16 +17275,10 @@
           <a:p>
             <a:pPr algn="ctr"/>
             <a:r>
-              <a:rPr lang="pt-BR" sz="2000" dirty="0"/>
+              <a:rPr lang="pt-BR" sz="2000" dirty="0" smtClean="0"/>
               <a:t>sr.hudrick@gmail.com</a:t>
             </a:r>
-          </a:p>
-          <a:p>
-            <a:pPr algn="ctr"/>
-            <a:r>
-              <a:rPr lang="pt-BR" sz="2000" dirty="0"/>
-              <a:t>willian.rodrigues1106@gmail.com</a:t>
-            </a:r>
+            <a:endParaRPr lang="pt-BR" sz="2000" dirty="0"/>
           </a:p>
         </p:txBody>
       </p:sp>

</xml_diff>